<commit_message>
Adicionando imagens no slide
</commit_message>
<xml_diff>
--- a/presentations/anatomia-fundamentos/property-binding.pptx
+++ b/presentations/anatomia-fundamentos/property-binding.pptx
@@ -251,7 +251,7 @@
           <a:p>
             <a:fld id="{1A323134-CEB1-9C43-B6DE-74B10BFB1C0A}" type="datetimeFigureOut">
               <a:rPr lang="en-US" smtClean="0"/>
-              <a:t>4/9/2018</a:t>
+              <a:t>4/10/2018</a:t>
             </a:fld>
             <a:endParaRPr lang="en-US"/>
           </a:p>
@@ -8100,6 +8100,36 @@
           </a:prstGeom>
         </p:spPr>
       </p:pic>
+      <p:pic>
+        <p:nvPicPr>
+          <p:cNvPr id="7" name="Picture 6">
+            <a:extLst>
+              <a:ext uri="{FF2B5EF4-FFF2-40B4-BE49-F238E27FC236}">
+                <a16:creationId xmlns:a16="http://schemas.microsoft.com/office/drawing/2014/main" id="{20BDB982-2654-4974-9891-A022FA4874F6}"/>
+              </a:ext>
+            </a:extLst>
+          </p:cNvPr>
+          <p:cNvPicPr>
+            <a:picLocks noChangeAspect="1"/>
+          </p:cNvPicPr>
+          <p:nvPr/>
+        </p:nvPicPr>
+        <p:blipFill>
+          <a:blip r:embed="rId3"/>
+          <a:stretch>
+            <a:fillRect/>
+          </a:stretch>
+        </p:blipFill>
+        <p:spPr>
+          <a:xfrm>
+            <a:off x="2974730" y="3074156"/>
+            <a:ext cx="6242538" cy="3130670"/>
+          </a:xfrm>
+          <a:prstGeom prst="rect">
+            <a:avLst/>
+          </a:prstGeom>
+        </p:spPr>
+      </p:pic>
     </p:spTree>
     <p:extLst>
       <p:ext uri="{BB962C8B-B14F-4D97-AF65-F5344CB8AC3E}">
@@ -8373,6 +8403,36 @@
           <a:xfrm>
             <a:off x="10690123" y="210236"/>
             <a:ext cx="1359310" cy="1359310"/>
+          </a:xfrm>
+          <a:prstGeom prst="rect">
+            <a:avLst/>
+          </a:prstGeom>
+        </p:spPr>
+      </p:pic>
+      <p:pic>
+        <p:nvPicPr>
+          <p:cNvPr id="3" name="Picture 2">
+            <a:extLst>
+              <a:ext uri="{FF2B5EF4-FFF2-40B4-BE49-F238E27FC236}">
+                <a16:creationId xmlns:a16="http://schemas.microsoft.com/office/drawing/2014/main" id="{A67A1DB5-9A31-40A7-8169-CFEEAC2B0BC3}"/>
+              </a:ext>
+            </a:extLst>
+          </p:cNvPr>
+          <p:cNvPicPr>
+            <a:picLocks noChangeAspect="1"/>
+          </p:cNvPicPr>
+          <p:nvPr/>
+        </p:nvPicPr>
+        <p:blipFill>
+          <a:blip r:embed="rId3"/>
+          <a:stretch>
+            <a:fillRect/>
+          </a:stretch>
+        </p:blipFill>
+        <p:spPr>
+          <a:xfrm>
+            <a:off x="2864826" y="2887102"/>
+            <a:ext cx="6462346" cy="3228742"/>
           </a:xfrm>
           <a:prstGeom prst="rect">
             <a:avLst/>
@@ -11125,15 +11185,6 @@
 </file>
 
 <file path=customXml/item2.xml><?xml version="1.0" encoding="utf-8"?>
-<?mso-contentType ?>
-<FormTemplates xmlns="http://schemas.microsoft.com/sharepoint/v3/contenttype/forms">
-  <Display>DocumentLibraryForm</Display>
-  <Edit>DocumentLibraryForm</Edit>
-  <New>DocumentLibraryForm</New>
-</FormTemplates>
-</file>
-
-<file path=customXml/item3.xml><?xml version="1.0" encoding="utf-8"?>
 <ct:contentTypeSchema xmlns:ct="http://schemas.microsoft.com/office/2006/metadata/contentType" xmlns:ma="http://schemas.microsoft.com/office/2006/metadata/properties/metaAttributes" ct:_="" ma:_="" ma:contentTypeName="Documento" ma:contentTypeID="0x01010036D5650AA20B9C4994D4F61BF86E88A5" ma:contentTypeVersion="2" ma:contentTypeDescription="Crie um novo documento." ma:contentTypeScope="" ma:versionID="5e061fff1f46b9b376a7df479f71f8c8">
   <xsd:schema xmlns:xsd="http://www.w3.org/2001/XMLSchema" xmlns:xs="http://www.w3.org/2001/XMLSchema" xmlns:p="http://schemas.microsoft.com/office/2006/metadata/properties" xmlns:ns2="07a316ae-5687-4ea8-90ab-e5c6f194d564" targetNamespace="http://schemas.microsoft.com/office/2006/metadata/properties" ma:root="true" ma:fieldsID="fa601322723508fdb4fa44b47fe0f447" ns2:_="">
     <xsd:import namespace="07a316ae-5687-4ea8-90ab-e5c6f194d564"/>
@@ -11265,6 +11316,15 @@
 </ct:contentTypeSchema>
 </file>
 
+<file path=customXml/item3.xml><?xml version="1.0" encoding="utf-8"?>
+<?mso-contentType ?>
+<FormTemplates xmlns="http://schemas.microsoft.com/sharepoint/v3/contenttype/forms">
+  <Display>DocumentLibraryForm</Display>
+  <Edit>DocumentLibraryForm</Edit>
+  <New>DocumentLibraryForm</New>
+</FormTemplates>
+</file>
+
 <file path=customXml/itemProps1.xml><?xml version="1.0" encoding="utf-8"?>
 <ds:datastoreItem xmlns:ds="http://schemas.openxmlformats.org/officeDocument/2006/customXml" ds:itemID="{840916AD-EA36-4B19-B020-346B3B08ACE2}">
   <ds:schemaRefs>
@@ -11282,14 +11342,6 @@
 </file>
 
 <file path=customXml/itemProps2.xml><?xml version="1.0" encoding="utf-8"?>
-<ds:datastoreItem xmlns:ds="http://schemas.openxmlformats.org/officeDocument/2006/customXml" ds:itemID="{CFC7BE12-D282-45D2-9360-ABE4B1901808}">
-  <ds:schemaRefs>
-    <ds:schemaRef ds:uri="http://schemas.microsoft.com/sharepoint/v3/contenttype/forms"/>
-  </ds:schemaRefs>
-</ds:datastoreItem>
-</file>
-
-<file path=customXml/itemProps3.xml><?xml version="1.0" encoding="utf-8"?>
 <ds:datastoreItem xmlns:ds="http://schemas.openxmlformats.org/officeDocument/2006/customXml" ds:itemID="{971ED77C-6313-42D6-A059-131B9D4A2F34}">
   <ds:schemaRefs>
     <ds:schemaRef ds:uri="http://schemas.microsoft.com/office/2006/metadata/contentType"/>
@@ -11305,4 +11357,12 @@
     <ds:schemaRef ds:uri="http://schemas.microsoft.com/internal/obd"/>
   </ds:schemaRefs>
 </ds:datastoreItem>
+</file>
+
+<file path=customXml/itemProps3.xml><?xml version="1.0" encoding="utf-8"?>
+<ds:datastoreItem xmlns:ds="http://schemas.openxmlformats.org/officeDocument/2006/customXml" ds:itemID="{CFC7BE12-D282-45D2-9360-ABE4B1901808}">
+  <ds:schemaRefs>
+    <ds:schemaRef ds:uri="http://schemas.microsoft.com/sharepoint/v3/contenttype/forms"/>
+  </ds:schemaRefs>
+</ds:datastoreItem>
 </file>
</xml_diff>